<commit_message>
complete Gate in laravel
</commit_message>
<xml_diff>
--- a/Presentation1.pptx
+++ b/Presentation1.pptx
@@ -9382,6 +9382,66 @@
           <a:xfrm>
             <a:off x="45720" y="845046"/>
             <a:ext cx="4993292" cy="1828800"/>
+          </a:xfrm>
+          <a:prstGeom prst="rect">
+            <a:avLst/>
+          </a:prstGeom>
+        </p:spPr>
+      </p:pic>
+      <p:pic>
+        <p:nvPicPr>
+          <p:cNvPr id="5" name="Picture 4">
+            <a:extLst>
+              <a:ext uri="{FF2B5EF4-FFF2-40B4-BE49-F238E27FC236}">
+                <a16:creationId xmlns:a16="http://schemas.microsoft.com/office/drawing/2014/main" id="{C3782F48-FD6F-6905-256B-FC27EA66E964}"/>
+              </a:ext>
+            </a:extLst>
+          </p:cNvPr>
+          <p:cNvPicPr>
+            <a:picLocks noChangeAspect="1"/>
+          </p:cNvPicPr>
+          <p:nvPr/>
+        </p:nvPicPr>
+        <p:blipFill>
+          <a:blip r:embed="rId3"/>
+          <a:stretch>
+            <a:fillRect/>
+          </a:stretch>
+        </p:blipFill>
+        <p:spPr>
+          <a:xfrm>
+            <a:off x="45723" y="2719566"/>
+            <a:ext cx="5148073" cy="1828800"/>
+          </a:xfrm>
+          <a:prstGeom prst="rect">
+            <a:avLst/>
+          </a:prstGeom>
+        </p:spPr>
+      </p:pic>
+      <p:pic>
+        <p:nvPicPr>
+          <p:cNvPr id="8" name="Picture 7">
+            <a:extLst>
+              <a:ext uri="{FF2B5EF4-FFF2-40B4-BE49-F238E27FC236}">
+                <a16:creationId xmlns:a16="http://schemas.microsoft.com/office/drawing/2014/main" id="{484478BE-229F-D0EE-D24F-EAD6CB1D0506}"/>
+              </a:ext>
+            </a:extLst>
+          </p:cNvPr>
+          <p:cNvPicPr>
+            <a:picLocks noChangeAspect="1"/>
+          </p:cNvPicPr>
+          <p:nvPr/>
+        </p:nvPicPr>
+        <p:blipFill>
+          <a:blip r:embed="rId4"/>
+          <a:stretch>
+            <a:fillRect/>
+          </a:stretch>
+        </p:blipFill>
+        <p:spPr>
+          <a:xfrm>
+            <a:off x="45721" y="4594086"/>
+            <a:ext cx="5134446" cy="731520"/>
           </a:xfrm>
           <a:prstGeom prst="rect">
             <a:avLst/>

</xml_diff>